<commit_message>
squash should be rebase
</commit_message>
<xml_diff>
--- a/Basics of Github.pptx
+++ b/Basics of Github.pptx
@@ -4989,8 +4989,13 @@
           <a:p>
             <a:r>
               <a:rPr lang="en-US" dirty="0"/>
-              <a:t>Git squash – squashes all the changes in a branch down to one.</a:t>
-            </a:r>
+              <a:t>Git rebase – squashes all the changes in a branch down to one, or rebases on </a:t>
+            </a:r>
+            <a:r>
+              <a:rPr lang="en-US"/>
+              <a:t>a different base</a:t>
+            </a:r>
+            <a:endParaRPr lang="en-US" dirty="0"/>
           </a:p>
           <a:p>
             <a:r>

</xml_diff>